<commit_message>
Compute H Matching PSat (T-Isotherm) with P0PK
</commit_message>
<xml_diff>
--- a/dev_help/conversions/pac-tool help draw.pptx
+++ b/dev_help/conversions/pac-tool help draw.pptx
@@ -44,8 +44,10 @@
     <p:sldId id="321" r:id="rId38"/>
     <p:sldId id="322" r:id="rId39"/>
     <p:sldId id="323" r:id="rId40"/>
-    <p:sldId id="325" r:id="rId41"/>
-    <p:sldId id="324" r:id="rId42"/>
+    <p:sldId id="326" r:id="rId41"/>
+    <p:sldId id="327" r:id="rId42"/>
+    <p:sldId id="325" r:id="rId43"/>
+    <p:sldId id="324" r:id="rId44"/>
   </p:sldIdLst>
   <p:sldSz cx="9144000" cy="6858000" type="screen4x3"/>
   <p:notesSz cx="6858000" cy="9144000"/>
@@ -328,7 +330,7 @@
           <a:p>
             <a:fld id="{42968C2D-30BC-42AA-92C6-446775E33AE6}" type="datetimeFigureOut">
               <a:rPr lang="fr-FR" smtClean="0"/>
-              <a:t>30/01/2017</a:t>
+              <a:t>03/02/2017</a:t>
             </a:fld>
             <a:endParaRPr lang="fr-FR"/>
           </a:p>
@@ -498,7 +500,7 @@
           <a:p>
             <a:fld id="{42968C2D-30BC-42AA-92C6-446775E33AE6}" type="datetimeFigureOut">
               <a:rPr lang="fr-FR" smtClean="0"/>
-              <a:t>30/01/2017</a:t>
+              <a:t>03/02/2017</a:t>
             </a:fld>
             <a:endParaRPr lang="fr-FR"/>
           </a:p>
@@ -678,7 +680,7 @@
           <a:p>
             <a:fld id="{42968C2D-30BC-42AA-92C6-446775E33AE6}" type="datetimeFigureOut">
               <a:rPr lang="fr-FR" smtClean="0"/>
-              <a:t>30/01/2017</a:t>
+              <a:t>03/02/2017</a:t>
             </a:fld>
             <a:endParaRPr lang="fr-FR"/>
           </a:p>
@@ -848,7 +850,7 @@
           <a:p>
             <a:fld id="{42968C2D-30BC-42AA-92C6-446775E33AE6}" type="datetimeFigureOut">
               <a:rPr lang="fr-FR" smtClean="0"/>
-              <a:t>30/01/2017</a:t>
+              <a:t>03/02/2017</a:t>
             </a:fld>
             <a:endParaRPr lang="fr-FR"/>
           </a:p>
@@ -1094,7 +1096,7 @@
           <a:p>
             <a:fld id="{42968C2D-30BC-42AA-92C6-446775E33AE6}" type="datetimeFigureOut">
               <a:rPr lang="fr-FR" smtClean="0"/>
-              <a:t>30/01/2017</a:t>
+              <a:t>03/02/2017</a:t>
             </a:fld>
             <a:endParaRPr lang="fr-FR"/>
           </a:p>
@@ -1382,7 +1384,7 @@
           <a:p>
             <a:fld id="{42968C2D-30BC-42AA-92C6-446775E33AE6}" type="datetimeFigureOut">
               <a:rPr lang="fr-FR" smtClean="0"/>
-              <a:t>30/01/2017</a:t>
+              <a:t>03/02/2017</a:t>
             </a:fld>
             <a:endParaRPr lang="fr-FR"/>
           </a:p>
@@ -1804,7 +1806,7 @@
           <a:p>
             <a:fld id="{42968C2D-30BC-42AA-92C6-446775E33AE6}" type="datetimeFigureOut">
               <a:rPr lang="fr-FR" smtClean="0"/>
-              <a:t>30/01/2017</a:t>
+              <a:t>03/02/2017</a:t>
             </a:fld>
             <a:endParaRPr lang="fr-FR"/>
           </a:p>
@@ -1922,7 +1924,7 @@
           <a:p>
             <a:fld id="{42968C2D-30BC-42AA-92C6-446775E33AE6}" type="datetimeFigureOut">
               <a:rPr lang="fr-FR" smtClean="0"/>
-              <a:t>30/01/2017</a:t>
+              <a:t>03/02/2017</a:t>
             </a:fld>
             <a:endParaRPr lang="fr-FR"/>
           </a:p>
@@ -2017,7 +2019,7 @@
           <a:p>
             <a:fld id="{42968C2D-30BC-42AA-92C6-446775E33AE6}" type="datetimeFigureOut">
               <a:rPr lang="fr-FR" smtClean="0"/>
-              <a:t>30/01/2017</a:t>
+              <a:t>03/02/2017</a:t>
             </a:fld>
             <a:endParaRPr lang="fr-FR"/>
           </a:p>
@@ -2294,7 +2296,7 @@
           <a:p>
             <a:fld id="{42968C2D-30BC-42AA-92C6-446775E33AE6}" type="datetimeFigureOut">
               <a:rPr lang="fr-FR" smtClean="0"/>
-              <a:t>30/01/2017</a:t>
+              <a:t>03/02/2017</a:t>
             </a:fld>
             <a:endParaRPr lang="fr-FR"/>
           </a:p>
@@ -2547,7 +2549,7 @@
           <a:p>
             <a:fld id="{42968C2D-30BC-42AA-92C6-446775E33AE6}" type="datetimeFigureOut">
               <a:rPr lang="fr-FR" smtClean="0"/>
-              <a:t>30/01/2017</a:t>
+              <a:t>03/02/2017</a:t>
             </a:fld>
             <a:endParaRPr lang="fr-FR"/>
           </a:p>
@@ -2760,7 +2762,7 @@
           <a:p>
             <a:fld id="{42968C2D-30BC-42AA-92C6-446775E33AE6}" type="datetimeFigureOut">
               <a:rPr lang="fr-FR" smtClean="0"/>
-              <a:t>30/01/2017</a:t>
+              <a:t>03/02/2017</a:t>
             </a:fld>
             <a:endParaRPr lang="fr-FR"/>
           </a:p>
@@ -12918,18 +12920,7 @@
                             <a:srgbClr val="FF0000"/>
                           </a:solidFill>
                         </a:rPr>
-                        <m:t>10</m:t>
-                      </m:r>
-                      <m:r>
-                        <m:rPr>
-                          <m:nor/>
-                        </m:rPr>
-                        <a:rPr lang="fr-FR" dirty="0" smtClean="0">
-                          <a:solidFill>
-                            <a:srgbClr val="FF0000"/>
-                          </a:solidFill>
-                        </a:rPr>
-                        <m:t>_</m:t>
+                        <m:t>10_</m:t>
                       </m:r>
                       <m:r>
                         <a:rPr lang="fr-FR" b="0" i="1" smtClean="0">
@@ -13030,18 +13021,7 @@
                             <a:srgbClr val="FF0000"/>
                           </a:solidFill>
                         </a:rPr>
-                        <m:t>10</m:t>
-                      </m:r>
-                      <m:r>
-                        <m:rPr>
-                          <m:nor/>
-                        </m:rPr>
-                        <a:rPr lang="fr-FR" dirty="0">
-                          <a:solidFill>
-                            <a:srgbClr val="FF0000"/>
-                          </a:solidFill>
-                        </a:rPr>
-                        <m:t>_</m:t>
+                        <m:t>10_</m:t>
                       </m:r>
                       <m:r>
                         <a:rPr lang="fr-FR" b="0" i="1" smtClean="0">
@@ -13111,18 +13091,7 @@
                             <a:srgbClr val="FF0000"/>
                           </a:solidFill>
                         </a:rPr>
-                        <m:t>10</m:t>
-                      </m:r>
-                      <m:r>
-                        <m:rPr>
-                          <m:nor/>
-                        </m:rPr>
-                        <a:rPr lang="fr-FR" dirty="0">
-                          <a:solidFill>
-                            <a:srgbClr val="FF0000"/>
-                          </a:solidFill>
-                        </a:rPr>
-                        <m:t>_</m:t>
+                        <m:t>10_</m:t>
                       </m:r>
                       <m:r>
                         <a:rPr lang="fr-FR" i="1">
@@ -16371,18 +16340,7 @@
                             <a:srgbClr val="FF0000"/>
                           </a:solidFill>
                         </a:rPr>
-                        <m:t>10</m:t>
-                      </m:r>
-                      <m:r>
-                        <m:rPr>
-                          <m:nor/>
-                        </m:rPr>
-                        <a:rPr lang="fr-FR" dirty="0" smtClean="0">
-                          <a:solidFill>
-                            <a:srgbClr val="FF0000"/>
-                          </a:solidFill>
-                        </a:rPr>
-                        <m:t>_</m:t>
+                        <m:t>10_</m:t>
                       </m:r>
                       <m:r>
                         <a:rPr lang="fr-FR" b="0" i="1" smtClean="0">
@@ -16483,18 +16441,7 @@
                             <a:srgbClr val="FF0000"/>
                           </a:solidFill>
                         </a:rPr>
-                        <m:t>10</m:t>
-                      </m:r>
-                      <m:r>
-                        <m:rPr>
-                          <m:nor/>
-                        </m:rPr>
-                        <a:rPr lang="fr-FR" dirty="0">
-                          <a:solidFill>
-                            <a:srgbClr val="FF0000"/>
-                          </a:solidFill>
-                        </a:rPr>
-                        <m:t>_</m:t>
+                        <m:t>10_</m:t>
                       </m:r>
                       <m:r>
                         <a:rPr lang="fr-FR" b="0" i="1" smtClean="0">
@@ -16564,18 +16511,7 @@
                             <a:srgbClr val="FF0000"/>
                           </a:solidFill>
                         </a:rPr>
-                        <m:t>10</m:t>
-                      </m:r>
-                      <m:r>
-                        <m:rPr>
-                          <m:nor/>
-                        </m:rPr>
-                        <a:rPr lang="fr-FR" dirty="0">
-                          <a:solidFill>
-                            <a:srgbClr val="FF0000"/>
-                          </a:solidFill>
-                        </a:rPr>
-                        <m:t>_</m:t>
+                        <m:t>10_</m:t>
                       </m:r>
                       <m:r>
                         <a:rPr lang="fr-FR" i="1">
@@ -16649,25 +16585,7 @@
                               </a:solidFill>
                               <a:latin typeface="Cambria Math"/>
                             </a:rPr>
-                            <m:t>100</m:t>
-                          </m:r>
-                          <m:r>
-                            <a:rPr lang="fr-FR" b="0" i="0" smtClean="0">
-                              <a:solidFill>
-                                <a:srgbClr val="FF0000"/>
-                              </a:solidFill>
-                              <a:latin typeface="Cambria Math"/>
-                            </a:rPr>
-                            <m:t>.</m:t>
-                          </m:r>
-                          <m:r>
-                            <a:rPr lang="fr-FR" b="0" i="0" smtClean="0">
-                              <a:solidFill>
-                                <a:srgbClr val="FF0000"/>
-                              </a:solidFill>
-                              <a:latin typeface="Cambria Math"/>
-                            </a:rPr>
-                            <m:t>0</m:t>
+                            <m:t>100.0</m:t>
                           </m:r>
                         </m:den>
                       </m:f>
@@ -24980,6 +24898,945 @@
         </p:nvSpPr>
         <p:spPr/>
         <p:txBody>
+          <a:bodyPr>
+            <a:normAutofit fontScale="90000"/>
+          </a:bodyPr>
+          <a:lstStyle/>
+          <a:p>
+            <a:r>
+              <a:rPr lang="en-US" dirty="0"/>
+              <a:t>Match Pressure to H vapor Saturation curve</a:t>
+            </a:r>
+            <a:br>
+              <a:rPr lang="en-US" dirty="0"/>
+            </a:br>
+            <a:r>
+              <a:rPr lang="en-US" dirty="0"/>
+              <a:t> * Correspond to intersection between P and Saturation H vapor</a:t>
+            </a:r>
+            <a:endParaRPr lang="fr-FR" dirty="0"/>
+          </a:p>
+        </p:txBody>
+      </p:sp>
+    </p:spTree>
+    <p:extLst>
+      <p:ext uri="{BB962C8B-B14F-4D97-AF65-F5344CB8AC3E}">
+        <p14:creationId xmlns:p14="http://schemas.microsoft.com/office/powerpoint/2010/main" val="1764775090"/>
+      </p:ext>
+    </p:extLst>
+  </p:cSld>
+  <p:clrMapOvr>
+    <a:masterClrMapping/>
+  </p:clrMapOvr>
+</p:sld>
+</file>
+
+<file path=ppt/slides/slide41.xml><?xml version="1.0" encoding="utf-8"?>
+<p:sld xmlns:a="http://schemas.openxmlformats.org/drawingml/2006/main" xmlns:r="http://schemas.openxmlformats.org/officeDocument/2006/relationships" xmlns:p="http://schemas.openxmlformats.org/presentationml/2006/main">
+  <p:cSld>
+    <p:spTree>
+      <p:nvGrpSpPr>
+        <p:cNvPr id="1" name=""/>
+        <p:cNvGrpSpPr/>
+        <p:nvPr/>
+      </p:nvGrpSpPr>
+      <p:grpSpPr>
+        <a:xfrm>
+          <a:off x="0" y="0"/>
+          <a:ext cx="0" cy="0"/>
+          <a:chOff x="0" y="0"/>
+          <a:chExt cx="0" cy="0"/>
+        </a:xfrm>
+      </p:grpSpPr>
+      <p:sp>
+        <p:nvSpPr>
+          <p:cNvPr id="2" name="Forme libre 1"/>
+          <p:cNvSpPr/>
+          <p:nvPr/>
+        </p:nvSpPr>
+        <p:spPr>
+          <a:xfrm>
+            <a:off x="2269530" y="1482707"/>
+            <a:ext cx="3778640" cy="3769912"/>
+          </a:xfrm>
+          <a:custGeom>
+            <a:avLst/>
+            <a:gdLst>
+              <a:gd name="connsiteX0" fmla="*/ 41870 w 3778640"/>
+              <a:gd name="connsiteY0" fmla="*/ 2936893 h 3769912"/>
+              <a:gd name="connsiteX1" fmla="*/ 435570 w 3778640"/>
+              <a:gd name="connsiteY1" fmla="*/ 523893 h 3769912"/>
+              <a:gd name="connsiteX2" fmla="*/ 3166070 w 3778640"/>
+              <a:gd name="connsiteY2" fmla="*/ 244493 h 3769912"/>
+              <a:gd name="connsiteX3" fmla="*/ 3724870 w 3778640"/>
+              <a:gd name="connsiteY3" fmla="*/ 3444893 h 3769912"/>
+              <a:gd name="connsiteX4" fmla="*/ 3724870 w 3778640"/>
+              <a:gd name="connsiteY4" fmla="*/ 3495693 h 3769912"/>
+            </a:gdLst>
+            <a:ahLst/>
+            <a:cxnLst>
+              <a:cxn ang="0">
+                <a:pos x="connsiteX0" y="connsiteY0"/>
+              </a:cxn>
+              <a:cxn ang="0">
+                <a:pos x="connsiteX1" y="connsiteY1"/>
+              </a:cxn>
+              <a:cxn ang="0">
+                <a:pos x="connsiteX2" y="connsiteY2"/>
+              </a:cxn>
+              <a:cxn ang="0">
+                <a:pos x="connsiteX3" y="connsiteY3"/>
+              </a:cxn>
+              <a:cxn ang="0">
+                <a:pos x="connsiteX4" y="connsiteY4"/>
+              </a:cxn>
+            </a:cxnLst>
+            <a:rect l="l" t="t" r="r" b="b"/>
+            <a:pathLst>
+              <a:path w="3778640" h="3769912">
+                <a:moveTo>
+                  <a:pt x="41870" y="2936893"/>
+                </a:moveTo>
+                <a:cubicBezTo>
+                  <a:pt x="-21630" y="1954759"/>
+                  <a:pt x="-85130" y="972626"/>
+                  <a:pt x="435570" y="523893"/>
+                </a:cubicBezTo>
+                <a:cubicBezTo>
+                  <a:pt x="956270" y="75160"/>
+                  <a:pt x="2617853" y="-242340"/>
+                  <a:pt x="3166070" y="244493"/>
+                </a:cubicBezTo>
+                <a:cubicBezTo>
+                  <a:pt x="3714287" y="731326"/>
+                  <a:pt x="3631737" y="2903026"/>
+                  <a:pt x="3724870" y="3444893"/>
+                </a:cubicBezTo>
+                <a:cubicBezTo>
+                  <a:pt x="3818003" y="3986760"/>
+                  <a:pt x="3771436" y="3741226"/>
+                  <a:pt x="3724870" y="3495693"/>
+                </a:cubicBezTo>
+              </a:path>
+            </a:pathLst>
+          </a:custGeom>
+          <a:noFill/>
+        </p:spPr>
+        <p:style>
+          <a:lnRef idx="2">
+            <a:schemeClr val="accent1">
+              <a:shade val="50000"/>
+            </a:schemeClr>
+          </a:lnRef>
+          <a:fillRef idx="1">
+            <a:schemeClr val="accent1"/>
+          </a:fillRef>
+          <a:effectRef idx="0">
+            <a:schemeClr val="accent1"/>
+          </a:effectRef>
+          <a:fontRef idx="minor">
+            <a:schemeClr val="lt1"/>
+          </a:fontRef>
+        </p:style>
+        <p:txBody>
+          <a:bodyPr rtlCol="0" anchor="ctr"/>
+          <a:lstStyle/>
+          <a:p>
+            <a:pPr algn="ctr"/>
+            <a:endParaRPr lang="fr-FR"/>
+          </a:p>
+        </p:txBody>
+      </p:sp>
+      <p:cxnSp>
+        <p:nvCxnSpPr>
+          <p:cNvPr id="4" name="Connecteur droit 3"/>
+          <p:cNvCxnSpPr/>
+          <p:nvPr/>
+        </p:nvCxnSpPr>
+        <p:spPr>
+          <a:xfrm>
+            <a:off x="1403648" y="3068960"/>
+            <a:ext cx="5976664" cy="0"/>
+          </a:xfrm>
+          <a:prstGeom prst="line">
+            <a:avLst/>
+          </a:prstGeom>
+        </p:spPr>
+        <p:style>
+          <a:lnRef idx="2">
+            <a:schemeClr val="accent2"/>
+          </a:lnRef>
+          <a:fillRef idx="0">
+            <a:schemeClr val="accent2"/>
+          </a:fillRef>
+          <a:effectRef idx="1">
+            <a:schemeClr val="accent2"/>
+          </a:effectRef>
+          <a:fontRef idx="minor">
+            <a:schemeClr val="tx1"/>
+          </a:fontRef>
+        </p:style>
+      </p:cxnSp>
+      <p:sp>
+        <p:nvSpPr>
+          <p:cNvPr id="6" name="ZoneTexte 5"/>
+          <p:cNvSpPr txBox="1"/>
+          <p:nvPr/>
+        </p:nvSpPr>
+        <p:spPr>
+          <a:xfrm>
+            <a:off x="1267079" y="2699628"/>
+            <a:ext cx="966931" cy="369332"/>
+          </a:xfrm>
+          <a:prstGeom prst="rect">
+            <a:avLst/>
+          </a:prstGeom>
+          <a:noFill/>
+        </p:spPr>
+        <p:txBody>
+          <a:bodyPr wrap="none" rtlCol="0">
+            <a:spAutoFit/>
+          </a:bodyPr>
+          <a:lstStyle/>
+          <a:p>
+            <a:r>
+              <a:rPr lang="fr-FR" dirty="0" smtClean="0"/>
+              <a:t>P0 or PK</a:t>
+            </a:r>
+            <a:endParaRPr lang="fr-FR" dirty="0"/>
+          </a:p>
+        </p:txBody>
+      </p:sp>
+      <p:cxnSp>
+        <p:nvCxnSpPr>
+          <p:cNvPr id="8" name="Connecteur droit 7"/>
+          <p:cNvCxnSpPr/>
+          <p:nvPr/>
+        </p:nvCxnSpPr>
+        <p:spPr>
+          <a:xfrm>
+            <a:off x="2051720" y="2348880"/>
+            <a:ext cx="3703239" cy="0"/>
+          </a:xfrm>
+          <a:prstGeom prst="line">
+            <a:avLst/>
+          </a:prstGeom>
+          <a:ln>
+            <a:solidFill>
+              <a:srgbClr val="C00000"/>
+            </a:solidFill>
+            <a:prstDash val="dashDot"/>
+          </a:ln>
+        </p:spPr>
+        <p:style>
+          <a:lnRef idx="1">
+            <a:schemeClr val="accent1"/>
+          </a:lnRef>
+          <a:fillRef idx="0">
+            <a:schemeClr val="accent1"/>
+          </a:fillRef>
+          <a:effectRef idx="0">
+            <a:schemeClr val="accent1"/>
+          </a:effectRef>
+          <a:fontRef idx="minor">
+            <a:schemeClr val="tx1"/>
+          </a:fontRef>
+        </p:style>
+      </p:cxnSp>
+      <p:sp>
+        <p:nvSpPr>
+          <p:cNvPr id="10" name="ZoneTexte 9"/>
+          <p:cNvSpPr txBox="1"/>
+          <p:nvPr/>
+        </p:nvSpPr>
+        <p:spPr>
+          <a:xfrm>
+            <a:off x="1403648" y="1947446"/>
+            <a:ext cx="941283" cy="369332"/>
+          </a:xfrm>
+          <a:prstGeom prst="rect">
+            <a:avLst/>
+          </a:prstGeom>
+          <a:noFill/>
+        </p:spPr>
+        <p:txBody>
+          <a:bodyPr wrap="none" rtlCol="0">
+            <a:spAutoFit/>
+          </a:bodyPr>
+          <a:lstStyle/>
+          <a:p>
+            <a:r>
+              <a:rPr lang="fr-FR" dirty="0" smtClean="0"/>
+              <a:t>T1 -&gt; P1</a:t>
+            </a:r>
+            <a:endParaRPr lang="fr-FR" dirty="0"/>
+          </a:p>
+        </p:txBody>
+      </p:sp>
+      <p:cxnSp>
+        <p:nvCxnSpPr>
+          <p:cNvPr id="12" name="Connecteur droit 11"/>
+          <p:cNvCxnSpPr/>
+          <p:nvPr/>
+        </p:nvCxnSpPr>
+        <p:spPr>
+          <a:xfrm>
+            <a:off x="5724128" y="1196752"/>
+            <a:ext cx="0" cy="4608512"/>
+          </a:xfrm>
+          <a:prstGeom prst="line">
+            <a:avLst/>
+          </a:prstGeom>
+        </p:spPr>
+        <p:style>
+          <a:lnRef idx="1">
+            <a:schemeClr val="accent1"/>
+          </a:lnRef>
+          <a:fillRef idx="0">
+            <a:schemeClr val="accent1"/>
+          </a:fillRef>
+          <a:effectRef idx="0">
+            <a:schemeClr val="accent1"/>
+          </a:effectRef>
+          <a:fontRef idx="minor">
+            <a:schemeClr val="tx1"/>
+          </a:fontRef>
+        </p:style>
+      </p:cxnSp>
+      <p:sp>
+        <p:nvSpPr>
+          <p:cNvPr id="15" name="ZoneTexte 14"/>
+          <p:cNvSpPr txBox="1"/>
+          <p:nvPr/>
+        </p:nvSpPr>
+        <p:spPr>
+          <a:xfrm>
+            <a:off x="5754960" y="1805226"/>
+            <a:ext cx="2492029" cy="369332"/>
+          </a:xfrm>
+          <a:prstGeom prst="rect">
+            <a:avLst/>
+          </a:prstGeom>
+          <a:noFill/>
+        </p:spPr>
+        <p:txBody>
+          <a:bodyPr wrap="none" rtlCol="0">
+            <a:spAutoFit/>
+          </a:bodyPr>
+          <a:lstStyle/>
+          <a:p>
+            <a:r>
+              <a:rPr lang="fr-FR" dirty="0" smtClean="0"/>
+              <a:t>H Saturation </a:t>
+            </a:r>
+            <a:r>
+              <a:rPr lang="fr-FR" dirty="0" err="1" smtClean="0"/>
+              <a:t>Vapor</a:t>
+            </a:r>
+            <a:r>
+              <a:rPr lang="fr-FR" dirty="0" smtClean="0"/>
+              <a:t> of P1</a:t>
+            </a:r>
+            <a:endParaRPr lang="fr-FR" dirty="0"/>
+          </a:p>
+        </p:txBody>
+      </p:sp>
+      <p:cxnSp>
+        <p:nvCxnSpPr>
+          <p:cNvPr id="17" name="Connecteur droit 16"/>
+          <p:cNvCxnSpPr/>
+          <p:nvPr/>
+        </p:nvCxnSpPr>
+        <p:spPr>
+          <a:xfrm>
+            <a:off x="5220072" y="1805226"/>
+            <a:ext cx="1418456" cy="1458054"/>
+          </a:xfrm>
+          <a:prstGeom prst="line">
+            <a:avLst/>
+          </a:prstGeom>
+        </p:spPr>
+        <p:style>
+          <a:lnRef idx="2">
+            <a:schemeClr val="accent6"/>
+          </a:lnRef>
+          <a:fillRef idx="0">
+            <a:schemeClr val="accent6"/>
+          </a:fillRef>
+          <a:effectRef idx="1">
+            <a:schemeClr val="accent6"/>
+          </a:effectRef>
+          <a:fontRef idx="minor">
+            <a:schemeClr val="tx1"/>
+          </a:fontRef>
+        </p:style>
+      </p:cxnSp>
+      <p:sp>
+        <p:nvSpPr>
+          <p:cNvPr id="23" name="ZoneTexte 22"/>
+          <p:cNvSpPr txBox="1"/>
+          <p:nvPr/>
+        </p:nvSpPr>
+        <p:spPr>
+          <a:xfrm>
+            <a:off x="6747074" y="2579156"/>
+            <a:ext cx="348172" cy="369332"/>
+          </a:xfrm>
+          <a:prstGeom prst="rect">
+            <a:avLst/>
+          </a:prstGeom>
+          <a:noFill/>
+        </p:spPr>
+        <p:txBody>
+          <a:bodyPr wrap="none" rtlCol="0">
+            <a:spAutoFit/>
+          </a:bodyPr>
+          <a:lstStyle/>
+          <a:p>
+            <a:r>
+              <a:rPr lang="fr-FR" dirty="0" smtClean="0"/>
+              <a:t>a </a:t>
+            </a:r>
+            <a:endParaRPr lang="fr-FR" dirty="0"/>
+          </a:p>
+        </p:txBody>
+      </p:sp>
+      <p:sp>
+        <p:nvSpPr>
+          <p:cNvPr id="24" name="Arc 23"/>
+          <p:cNvSpPr/>
+          <p:nvPr/>
+        </p:nvSpPr>
+        <p:spPr>
+          <a:xfrm rot="2079001">
+            <a:off x="6099340" y="2236082"/>
+            <a:ext cx="590358" cy="720080"/>
+          </a:xfrm>
+          <a:prstGeom prst="arc">
+            <a:avLst>
+              <a:gd name="adj1" fmla="val 16915181"/>
+              <a:gd name="adj2" fmla="val 4793873"/>
+            </a:avLst>
+          </a:prstGeom>
+        </p:spPr>
+        <p:style>
+          <a:lnRef idx="1">
+            <a:schemeClr val="accent1"/>
+          </a:lnRef>
+          <a:fillRef idx="0">
+            <a:schemeClr val="accent1"/>
+          </a:fillRef>
+          <a:effectRef idx="0">
+            <a:schemeClr val="accent1"/>
+          </a:effectRef>
+          <a:fontRef idx="minor">
+            <a:schemeClr val="tx1"/>
+          </a:fontRef>
+        </p:style>
+        <p:txBody>
+          <a:bodyPr rtlCol="0" anchor="ctr"/>
+          <a:lstStyle/>
+          <a:p>
+            <a:pPr algn="ctr"/>
+            <a:endParaRPr lang="fr-FR"/>
+          </a:p>
+        </p:txBody>
+      </p:sp>
+      <p:sp>
+        <p:nvSpPr>
+          <p:cNvPr id="25" name="Ellipse 24"/>
+          <p:cNvSpPr/>
+          <p:nvPr/>
+        </p:nvSpPr>
+        <p:spPr>
+          <a:xfrm>
+            <a:off x="6394518" y="3008724"/>
+            <a:ext cx="121697" cy="120472"/>
+          </a:xfrm>
+          <a:prstGeom prst="ellipse">
+            <a:avLst/>
+          </a:prstGeom>
+        </p:spPr>
+        <p:style>
+          <a:lnRef idx="1">
+            <a:schemeClr val="accent2"/>
+          </a:lnRef>
+          <a:fillRef idx="3">
+            <a:schemeClr val="accent2"/>
+          </a:fillRef>
+          <a:effectRef idx="2">
+            <a:schemeClr val="accent2"/>
+          </a:effectRef>
+          <a:fontRef idx="minor">
+            <a:schemeClr val="lt1"/>
+          </a:fontRef>
+        </p:style>
+        <p:txBody>
+          <a:bodyPr rtlCol="0" anchor="ctr"/>
+          <a:lstStyle/>
+          <a:p>
+            <a:pPr algn="ctr"/>
+            <a:endParaRPr lang="fr-FR"/>
+          </a:p>
+        </p:txBody>
+      </p:sp>
+      <p:sp>
+        <p:nvSpPr>
+          <p:cNvPr id="26" name="Ellipse 25"/>
+          <p:cNvSpPr/>
+          <p:nvPr/>
+        </p:nvSpPr>
+        <p:spPr>
+          <a:xfrm>
+            <a:off x="5694111" y="2288644"/>
+            <a:ext cx="121697" cy="120472"/>
+          </a:xfrm>
+          <a:prstGeom prst="ellipse">
+            <a:avLst/>
+          </a:prstGeom>
+        </p:spPr>
+        <p:style>
+          <a:lnRef idx="0">
+            <a:schemeClr val="accent4"/>
+          </a:lnRef>
+          <a:fillRef idx="3">
+            <a:schemeClr val="accent4"/>
+          </a:fillRef>
+          <a:effectRef idx="3">
+            <a:schemeClr val="accent4"/>
+          </a:effectRef>
+          <a:fontRef idx="minor">
+            <a:schemeClr val="lt1"/>
+          </a:fontRef>
+        </p:style>
+        <p:txBody>
+          <a:bodyPr rtlCol="0" anchor="ctr"/>
+          <a:lstStyle/>
+          <a:p>
+            <a:pPr algn="ctr"/>
+            <a:endParaRPr lang="fr-FR"/>
+          </a:p>
+        </p:txBody>
+      </p:sp>
+      <p:sp>
+        <p:nvSpPr>
+          <p:cNvPr id="27" name="ZoneTexte 26"/>
+          <p:cNvSpPr txBox="1"/>
+          <p:nvPr/>
+        </p:nvSpPr>
+        <p:spPr>
+          <a:xfrm>
+            <a:off x="4391980" y="2369240"/>
+            <a:ext cx="1279453" cy="646331"/>
+          </a:xfrm>
+          <a:prstGeom prst="rect">
+            <a:avLst/>
+          </a:prstGeom>
+          <a:noFill/>
+        </p:spPr>
+        <p:txBody>
+          <a:bodyPr wrap="none" rtlCol="0">
+            <a:spAutoFit/>
+          </a:bodyPr>
+          <a:lstStyle/>
+          <a:p>
+            <a:r>
+              <a:rPr lang="fr-FR" dirty="0" smtClean="0"/>
+              <a:t>(X0,Y0)</a:t>
+            </a:r>
+          </a:p>
+          <a:p>
+            <a:r>
+              <a:rPr lang="fr-FR" dirty="0" smtClean="0"/>
+              <a:t>(</a:t>
+            </a:r>
+            <a:r>
+              <a:rPr lang="fr-FR" dirty="0" err="1" smtClean="0"/>
+              <a:t>Hsatv,Psat</a:t>
+            </a:r>
+            <a:r>
+              <a:rPr lang="fr-FR" dirty="0" smtClean="0"/>
+              <a:t>)</a:t>
+            </a:r>
+            <a:endParaRPr lang="fr-FR" dirty="0"/>
+          </a:p>
+        </p:txBody>
+      </p:sp>
+      <p:sp>
+        <p:nvSpPr>
+          <p:cNvPr id="28" name="ZoneTexte 27"/>
+          <p:cNvSpPr txBox="1"/>
+          <p:nvPr/>
+        </p:nvSpPr>
+        <p:spPr>
+          <a:xfrm>
+            <a:off x="6221843" y="3352046"/>
+            <a:ext cx="1572866" cy="646331"/>
+          </a:xfrm>
+          <a:prstGeom prst="rect">
+            <a:avLst/>
+          </a:prstGeom>
+          <a:noFill/>
+        </p:spPr>
+        <p:txBody>
+          <a:bodyPr wrap="none" rtlCol="0">
+            <a:spAutoFit/>
+          </a:bodyPr>
+          <a:lstStyle/>
+          <a:p>
+            <a:r>
+              <a:rPr lang="fr-FR" dirty="0" smtClean="0"/>
+              <a:t>(X1,Y1)</a:t>
+            </a:r>
+          </a:p>
+          <a:p>
+            <a:r>
+              <a:rPr lang="fr-FR" dirty="0" smtClean="0"/>
+              <a:t>(P0PK,Hmpiso)</a:t>
+            </a:r>
+            <a:endParaRPr lang="fr-FR" dirty="0"/>
+          </a:p>
+        </p:txBody>
+      </p:sp>
+      <p:sp>
+        <p:nvSpPr>
+          <p:cNvPr id="29" name="ZoneTexte 28"/>
+          <p:cNvSpPr txBox="1"/>
+          <p:nvPr/>
+        </p:nvSpPr>
+        <p:spPr>
+          <a:xfrm>
+            <a:off x="3131840" y="4509120"/>
+            <a:ext cx="5359352" cy="1477328"/>
+          </a:xfrm>
+          <a:prstGeom prst="rect">
+            <a:avLst/>
+          </a:prstGeom>
+          <a:noFill/>
+        </p:spPr>
+        <p:txBody>
+          <a:bodyPr wrap="none" rtlCol="0">
+            <a:spAutoFit/>
+          </a:bodyPr>
+          <a:lstStyle/>
+          <a:p>
+            <a:r>
+              <a:rPr lang="fr-FR" dirty="0"/>
+              <a:t>t</a:t>
+            </a:r>
+            <a:r>
+              <a:rPr lang="fr-FR" dirty="0" smtClean="0"/>
+              <a:t>an(a) = (Y1-Y0)/(X1-X0)</a:t>
+            </a:r>
+          </a:p>
+          <a:p>
+            <a:r>
+              <a:rPr lang="fr-FR" dirty="0" smtClean="0"/>
+              <a:t>Y1= Y0 + (X1-X0).tan(a)</a:t>
+            </a:r>
+          </a:p>
+          <a:p>
+            <a:endParaRPr lang="fr-FR" dirty="0" smtClean="0"/>
+          </a:p>
+          <a:p>
+            <a:r>
+              <a:rPr lang="fr-FR" dirty="0"/>
+              <a:t>a</a:t>
+            </a:r>
+            <a:r>
+              <a:rPr lang="fr-FR" dirty="0" smtClean="0"/>
+              <a:t> = angle approximation for H </a:t>
+            </a:r>
+            <a:r>
+              <a:rPr lang="fr-FR" dirty="0" err="1" smtClean="0"/>
+              <a:t>Matching</a:t>
+            </a:r>
+            <a:r>
+              <a:rPr lang="fr-FR" dirty="0" smtClean="0"/>
+              <a:t> </a:t>
+            </a:r>
+            <a:r>
+              <a:rPr lang="fr-FR" dirty="0" err="1" smtClean="0"/>
+              <a:t>PSat</a:t>
+            </a:r>
+            <a:r>
+              <a:rPr lang="fr-FR" dirty="0" smtClean="0"/>
+              <a:t> </a:t>
+            </a:r>
+            <a:r>
+              <a:rPr lang="fr-FR" dirty="0" err="1" smtClean="0"/>
+              <a:t>with</a:t>
+            </a:r>
+            <a:r>
+              <a:rPr lang="fr-FR" dirty="0" smtClean="0"/>
+              <a:t> P0PK</a:t>
+            </a:r>
+          </a:p>
+          <a:p>
+            <a:r>
+              <a:rPr lang="fr-FR" dirty="0"/>
+              <a:t> </a:t>
+            </a:r>
+            <a:r>
+              <a:rPr lang="fr-FR" dirty="0" smtClean="0"/>
+              <a:t>      angleHmatchPSatWithP0PK</a:t>
+            </a:r>
+            <a:endParaRPr lang="fr-FR" dirty="0"/>
+          </a:p>
+        </p:txBody>
+      </p:sp>
+      <p:sp>
+        <p:nvSpPr>
+          <p:cNvPr id="30" name="Arc 29"/>
+          <p:cNvSpPr/>
+          <p:nvPr/>
+        </p:nvSpPr>
+        <p:spPr>
+          <a:xfrm rot="20562055">
+            <a:off x="5265092" y="2308812"/>
+            <a:ext cx="1220940" cy="1941471"/>
+          </a:xfrm>
+          <a:prstGeom prst="arc">
+            <a:avLst>
+              <a:gd name="adj1" fmla="val 16202962"/>
+              <a:gd name="adj2" fmla="val 0"/>
+            </a:avLst>
+          </a:prstGeom>
+          <a:ln>
+            <a:prstDash val="dashDot"/>
+          </a:ln>
+        </p:spPr>
+        <p:style>
+          <a:lnRef idx="1">
+            <a:schemeClr val="accent2"/>
+          </a:lnRef>
+          <a:fillRef idx="0">
+            <a:schemeClr val="accent2"/>
+          </a:fillRef>
+          <a:effectRef idx="0">
+            <a:schemeClr val="accent2"/>
+          </a:effectRef>
+          <a:fontRef idx="minor">
+            <a:schemeClr val="tx1"/>
+          </a:fontRef>
+        </p:style>
+        <p:txBody>
+          <a:bodyPr rtlCol="0" anchor="ctr"/>
+          <a:lstStyle/>
+          <a:p>
+            <a:pPr algn="ctr"/>
+            <a:endParaRPr lang="fr-FR"/>
+          </a:p>
+        </p:txBody>
+      </p:sp>
+      <p:sp>
+        <p:nvSpPr>
+          <p:cNvPr id="31" name="ZoneTexte 30"/>
+          <p:cNvSpPr txBox="1"/>
+          <p:nvPr/>
+        </p:nvSpPr>
+        <p:spPr>
+          <a:xfrm>
+            <a:off x="6009693" y="2348880"/>
+            <a:ext cx="609462" cy="230832"/>
+          </a:xfrm>
+          <a:prstGeom prst="rect">
+            <a:avLst/>
+          </a:prstGeom>
+          <a:noFill/>
+        </p:spPr>
+        <p:txBody>
+          <a:bodyPr wrap="none" rtlCol="0">
+            <a:spAutoFit/>
+          </a:bodyPr>
+          <a:lstStyle/>
+          <a:p>
+            <a:r>
+              <a:rPr lang="fr-FR" sz="900" dirty="0" err="1" smtClean="0"/>
+              <a:t>Isotherm</a:t>
+            </a:r>
+            <a:endParaRPr lang="fr-FR" sz="900" dirty="0"/>
+          </a:p>
+        </p:txBody>
+      </p:sp>
+      <p:sp>
+        <p:nvSpPr>
+          <p:cNvPr id="34" name="ZoneTexte 33"/>
+          <p:cNvSpPr txBox="1"/>
+          <p:nvPr/>
+        </p:nvSpPr>
+        <p:spPr>
+          <a:xfrm>
+            <a:off x="4032118" y="2118048"/>
+            <a:ext cx="609462" cy="230832"/>
+          </a:xfrm>
+          <a:prstGeom prst="rect">
+            <a:avLst/>
+          </a:prstGeom>
+          <a:noFill/>
+        </p:spPr>
+        <p:txBody>
+          <a:bodyPr wrap="none" rtlCol="0">
+            <a:spAutoFit/>
+          </a:bodyPr>
+          <a:lstStyle/>
+          <a:p>
+            <a:r>
+              <a:rPr lang="fr-FR" sz="900" dirty="0" err="1" smtClean="0"/>
+              <a:t>Isotherm</a:t>
+            </a:r>
+            <a:endParaRPr lang="fr-FR" sz="900" dirty="0"/>
+          </a:p>
+        </p:txBody>
+      </p:sp>
+      <p:cxnSp>
+        <p:nvCxnSpPr>
+          <p:cNvPr id="38" name="Connecteur droit 37"/>
+          <p:cNvCxnSpPr/>
+          <p:nvPr/>
+        </p:nvCxnSpPr>
+        <p:spPr>
+          <a:xfrm>
+            <a:off x="5724128" y="2361049"/>
+            <a:ext cx="1625352" cy="0"/>
+          </a:xfrm>
+          <a:prstGeom prst="line">
+            <a:avLst/>
+          </a:prstGeom>
+        </p:spPr>
+        <p:style>
+          <a:lnRef idx="1">
+            <a:schemeClr val="accent1"/>
+          </a:lnRef>
+          <a:fillRef idx="0">
+            <a:schemeClr val="accent1"/>
+          </a:fillRef>
+          <a:effectRef idx="0">
+            <a:schemeClr val="accent1"/>
+          </a:effectRef>
+          <a:fontRef idx="minor">
+            <a:schemeClr val="tx1"/>
+          </a:fontRef>
+        </p:style>
+      </p:cxnSp>
+      <p:sp>
+        <p:nvSpPr>
+          <p:cNvPr id="39" name="ZoneTexte 38"/>
+          <p:cNvSpPr txBox="1"/>
+          <p:nvPr/>
+        </p:nvSpPr>
+        <p:spPr>
+          <a:xfrm>
+            <a:off x="681745" y="5949280"/>
+            <a:ext cx="4918398" cy="646331"/>
+          </a:xfrm>
+          <a:prstGeom prst="rect">
+            <a:avLst/>
+          </a:prstGeom>
+          <a:noFill/>
+        </p:spPr>
+        <p:txBody>
+          <a:bodyPr wrap="none" rtlCol="0">
+            <a:spAutoFit/>
+          </a:bodyPr>
+          <a:lstStyle/>
+          <a:p>
+            <a:r>
+              <a:rPr lang="fr-FR" dirty="0" err="1" smtClean="0"/>
+              <a:t>Compute</a:t>
+            </a:r>
+            <a:r>
+              <a:rPr lang="fr-FR" dirty="0" smtClean="0"/>
+              <a:t> H </a:t>
+            </a:r>
+            <a:r>
+              <a:rPr lang="fr-FR" dirty="0" err="1" smtClean="0"/>
+              <a:t>Matching</a:t>
+            </a:r>
+            <a:r>
+              <a:rPr lang="fr-FR" dirty="0" smtClean="0"/>
+              <a:t> </a:t>
+            </a:r>
+            <a:r>
+              <a:rPr lang="fr-FR" dirty="0" err="1" smtClean="0"/>
+              <a:t>PSat</a:t>
+            </a:r>
+            <a:r>
+              <a:rPr lang="fr-FR" dirty="0" smtClean="0"/>
+              <a:t> (T-</a:t>
+            </a:r>
+            <a:r>
+              <a:rPr lang="fr-FR" dirty="0" err="1" smtClean="0"/>
+              <a:t>Isotherm</a:t>
+            </a:r>
+            <a:r>
+              <a:rPr lang="fr-FR" dirty="0"/>
+              <a:t>)</a:t>
+            </a:r>
+            <a:r>
+              <a:rPr lang="fr-FR" dirty="0" smtClean="0"/>
+              <a:t> </a:t>
+            </a:r>
+            <a:r>
+              <a:rPr lang="fr-FR" dirty="0" err="1" smtClean="0"/>
+              <a:t>with</a:t>
+            </a:r>
+            <a:r>
+              <a:rPr lang="fr-FR" dirty="0" smtClean="0"/>
+              <a:t> P0PK </a:t>
+            </a:r>
+          </a:p>
+          <a:p>
+            <a:r>
+              <a:rPr lang="fr-FR" dirty="0" smtClean="0"/>
+              <a:t>CompHmatchPSatWithP0PK</a:t>
+            </a:r>
+            <a:endParaRPr lang="fr-FR" dirty="0"/>
+          </a:p>
+        </p:txBody>
+      </p:sp>
+    </p:spTree>
+    <p:extLst>
+      <p:ext uri="{BB962C8B-B14F-4D97-AF65-F5344CB8AC3E}">
+        <p14:creationId xmlns:p14="http://schemas.microsoft.com/office/powerpoint/2010/main" val="3772830421"/>
+      </p:ext>
+    </p:extLst>
+  </p:cSld>
+  <p:clrMapOvr>
+    <a:masterClrMapping/>
+  </p:clrMapOvr>
+</p:sld>
+</file>
+
+<file path=ppt/slides/slide42.xml><?xml version="1.0" encoding="utf-8"?>
+<p:sld xmlns:a="http://schemas.openxmlformats.org/drawingml/2006/main" xmlns:r="http://schemas.openxmlformats.org/officeDocument/2006/relationships" xmlns:p="http://schemas.openxmlformats.org/presentationml/2006/main">
+  <p:cSld>
+    <p:spTree>
+      <p:nvGrpSpPr>
+        <p:cNvPr id="1" name=""/>
+        <p:cNvGrpSpPr/>
+        <p:nvPr/>
+      </p:nvGrpSpPr>
+      <p:grpSpPr>
+        <a:xfrm>
+          <a:off x="0" y="0"/>
+          <a:ext cx="0" cy="0"/>
+          <a:chOff x="0" y="0"/>
+          <a:chExt cx="0" cy="0"/>
+        </a:xfrm>
+      </p:grpSpPr>
+      <p:sp>
+        <p:nvSpPr>
+          <p:cNvPr id="2" name="Titre 1"/>
+          <p:cNvSpPr>
+            <a:spLocks noGrp="1"/>
+          </p:cNvSpPr>
+          <p:nvPr>
+            <p:ph type="ctrTitle"/>
+          </p:nvPr>
+        </p:nvSpPr>
+        <p:spPr/>
+        <p:txBody>
           <a:bodyPr/>
           <a:lstStyle/>
           <a:p>
@@ -25004,7 +25861,7 @@
 </p:sld>
 </file>
 
-<file path=ppt/slides/slide41.xml><?xml version="1.0" encoding="utf-8"?>
+<file path=ppt/slides/slide43.xml><?xml version="1.0" encoding="utf-8"?>
 <p:sld xmlns:a="http://schemas.openxmlformats.org/drawingml/2006/main" xmlns:r="http://schemas.openxmlformats.org/officeDocument/2006/relationships" xmlns:p="http://schemas.openxmlformats.org/presentationml/2006/main">
   <p:cSld>
     <p:spTree>

</xml_diff>